<commit_message>
fix typos,add end slide
</commit_message>
<xml_diff>
--- a/documents/Milestone_1_Presentation.pptx
+++ b/documents/Milestone_1_Presentation.pptx
@@ -5,7 +5,7 @@
     <p:sldMasterId id="2147483648" r:id="rId1"/>
   </p:sldMasterIdLst>
   <p:notesMasterIdLst>
-    <p:notesMasterId r:id="rId17"/>
+    <p:notesMasterId r:id="rId18"/>
   </p:notesMasterIdLst>
   <p:sldIdLst>
     <p:sldId id="256" r:id="rId2"/>
@@ -23,6 +23,7 @@
     <p:sldId id="265" r:id="rId14"/>
     <p:sldId id="266" r:id="rId15"/>
     <p:sldId id="261" r:id="rId16"/>
+    <p:sldId id="273" r:id="rId17"/>
   </p:sldIdLst>
   <p:sldSz cx="12192000" cy="6858000"/>
   <p:notesSz cx="6858000" cy="9144000"/>
@@ -4370,7 +4371,7 @@
         </p:nvSpPr>
         <p:spPr>
           <a:xfrm>
-            <a:off x="4934752" y="3249846"/>
+            <a:off x="6096000" y="2652898"/>
             <a:ext cx="2322495" cy="358307"/>
           </a:xfrm>
         </p:spPr>
@@ -4453,8 +4454,8 @@
         </p:nvSpPr>
         <p:spPr>
           <a:xfrm>
-            <a:off x="4970419" y="3902975"/>
-            <a:ext cx="2524858" cy="369332"/>
+            <a:off x="3970298" y="4285100"/>
+            <a:ext cx="4251403" cy="523220"/>
           </a:xfrm>
           <a:prstGeom prst="rect">
             <a:avLst/>
@@ -4468,18 +4469,18 @@
           <a:lstStyle/>
           <a:p>
             <a:r>
-              <a:rPr lang="en-US" dirty="0"/>
+              <a:rPr lang="en-US" sz="2800" dirty="0"/>
               <a:t>Tom Ali S</a:t>
             </a:r>
             <a:r>
-              <a:rPr lang="en-GB" dirty="0" err="1"/>
+              <a:rPr lang="en-GB" sz="2800" dirty="0" err="1"/>
               <a:t>ébastien</a:t>
             </a:r>
             <a:r>
-              <a:rPr lang="en-GB" dirty="0"/>
+              <a:rPr lang="en-GB" sz="2800" dirty="0"/>
               <a:t> Gian</a:t>
             </a:r>
-            <a:endParaRPr lang="de-CH" dirty="0"/>
+            <a:endParaRPr lang="de-CH" sz="2800" dirty="0"/>
           </a:p>
         </p:txBody>
       </p:sp>
@@ -5819,6 +5820,159 @@
 </p:sld>
 </file>
 
+<file path=ppt/slides/slide16.xml><?xml version="1.0" encoding="utf-8"?>
+<p:sld xmlns:a="http://schemas.openxmlformats.org/drawingml/2006/main" xmlns:r="http://schemas.openxmlformats.org/officeDocument/2006/relationships" xmlns:p="http://schemas.openxmlformats.org/presentationml/2006/main">
+  <p:cSld>
+    <p:spTree>
+      <p:nvGrpSpPr>
+        <p:cNvPr id="1" name=""/>
+        <p:cNvGrpSpPr/>
+        <p:nvPr/>
+      </p:nvGrpSpPr>
+      <p:grpSpPr>
+        <a:xfrm>
+          <a:off x="0" y="0"/>
+          <a:ext cx="0" cy="0"/>
+          <a:chOff x="0" y="0"/>
+          <a:chExt cx="0" cy="0"/>
+        </a:xfrm>
+      </p:grpSpPr>
+      <p:sp>
+        <p:nvSpPr>
+          <p:cNvPr id="3" name="Subtitle 2">
+            <a:extLst>
+              <a:ext uri="{FF2B5EF4-FFF2-40B4-BE49-F238E27FC236}">
+                <a16:creationId xmlns:a16="http://schemas.microsoft.com/office/drawing/2014/main" id="{757F38D5-7ABE-497E-B302-710E33E4B431}"/>
+              </a:ext>
+            </a:extLst>
+          </p:cNvPr>
+          <p:cNvSpPr>
+            <a:spLocks noGrp="1"/>
+          </p:cNvSpPr>
+          <p:nvPr>
+            <p:ph type="subTitle" idx="1"/>
+          </p:nvPr>
+        </p:nvSpPr>
+        <p:spPr>
+          <a:xfrm>
+            <a:off x="6096000" y="2652898"/>
+            <a:ext cx="2322495" cy="358307"/>
+          </a:xfrm>
+        </p:spPr>
+        <p:txBody>
+          <a:bodyPr>
+            <a:noAutofit/>
+          </a:bodyPr>
+          <a:lstStyle/>
+          <a:p>
+            <a:pPr algn="l"/>
+            <a:r>
+              <a:rPr lang="de-CH" sz="2800" dirty="0" err="1"/>
+              <a:t>by</a:t>
+            </a:r>
+            <a:r>
+              <a:rPr lang="de-CH" sz="2800" dirty="0"/>
+              <a:t> TASG Force</a:t>
+            </a:r>
+            <a:endParaRPr lang="en-GB" sz="2800" dirty="0"/>
+          </a:p>
+        </p:txBody>
+      </p:sp>
+      <p:sp>
+        <p:nvSpPr>
+          <p:cNvPr id="5" name="Title 4">
+            <a:extLst>
+              <a:ext uri="{FF2B5EF4-FFF2-40B4-BE49-F238E27FC236}">
+                <a16:creationId xmlns:a16="http://schemas.microsoft.com/office/drawing/2014/main" id="{0968FF57-B9DA-472D-8F5E-ACFE44A2C379}"/>
+              </a:ext>
+            </a:extLst>
+          </p:cNvPr>
+          <p:cNvSpPr>
+            <a:spLocks noGrp="1"/>
+          </p:cNvSpPr>
+          <p:nvPr>
+            <p:ph type="ctrTitle"/>
+          </p:nvPr>
+        </p:nvSpPr>
+        <p:spPr>
+          <a:xfrm>
+            <a:off x="3286405" y="1722283"/>
+            <a:ext cx="5649365" cy="1232741"/>
+          </a:xfrm>
+        </p:spPr>
+        <p:txBody>
+          <a:bodyPr>
+            <a:noAutofit/>
+          </a:bodyPr>
+          <a:lstStyle/>
+          <a:p>
+            <a:r>
+              <a:rPr lang="de-CH" sz="9600" b="1" dirty="0" err="1">
+                <a:latin typeface="+mn-lt"/>
+              </a:rPr>
+              <a:t>Ore</a:t>
+            </a:r>
+            <a:r>
+              <a:rPr lang="de-CH" sz="9600" b="1" dirty="0">
+                <a:latin typeface="+mn-lt"/>
+              </a:rPr>
+              <a:t> Rush</a:t>
+            </a:r>
+            <a:endParaRPr lang="en-GB" sz="9600" b="1" dirty="0">
+              <a:latin typeface="+mn-lt"/>
+            </a:endParaRPr>
+          </a:p>
+        </p:txBody>
+      </p:sp>
+      <p:sp>
+        <p:nvSpPr>
+          <p:cNvPr id="2" name="Textfeld 1">
+            <a:extLst>
+              <a:ext uri="{FF2B5EF4-FFF2-40B4-BE49-F238E27FC236}">
+                <a16:creationId xmlns:a16="http://schemas.microsoft.com/office/drawing/2014/main" id="{5FFFEE46-C053-49DC-A25F-120F83ECFB60}"/>
+              </a:ext>
+            </a:extLst>
+          </p:cNvPr>
+          <p:cNvSpPr txBox="1"/>
+          <p:nvPr/>
+        </p:nvSpPr>
+        <p:spPr>
+          <a:xfrm>
+            <a:off x="6111088" y="4479654"/>
+            <a:ext cx="2556258" cy="523220"/>
+          </a:xfrm>
+          <a:prstGeom prst="rect">
+            <a:avLst/>
+          </a:prstGeom>
+          <a:noFill/>
+        </p:spPr>
+        <p:txBody>
+          <a:bodyPr wrap="square" rtlCol="0">
+            <a:spAutoFit/>
+          </a:bodyPr>
+          <a:lstStyle/>
+          <a:p>
+            <a:r>
+              <a:rPr lang="en-GB" sz="2800" dirty="0"/>
+              <a:t>Coming soon…</a:t>
+            </a:r>
+            <a:endParaRPr lang="de-CH" sz="2800" dirty="0"/>
+          </a:p>
+        </p:txBody>
+      </p:sp>
+    </p:spTree>
+    <p:extLst>
+      <p:ext uri="{BB962C8B-B14F-4D97-AF65-F5344CB8AC3E}">
+        <p14:creationId xmlns:p14="http://schemas.microsoft.com/office/powerpoint/2010/main" val="1440648216"/>
+      </p:ext>
+    </p:extLst>
+  </p:cSld>
+  <p:clrMapOvr>
+    <a:masterClrMapping/>
+  </p:clrMapOvr>
+</p:sld>
+</file>
+
 <file path=ppt/slides/slide2.xml><?xml version="1.0" encoding="utf-8"?>
 <p:sld xmlns:a="http://schemas.openxmlformats.org/drawingml/2006/main" xmlns:r="http://schemas.openxmlformats.org/officeDocument/2006/relationships" xmlns:p="http://schemas.openxmlformats.org/presentationml/2006/main">
   <p:cSld>
@@ -5900,7 +6054,7 @@
         <p:spPr>
           <a:xfrm>
             <a:off x="756719" y="2463250"/>
-            <a:ext cx="4955628" cy="2799414"/>
+            <a:ext cx="4885324" cy="2799414"/>
           </a:xfrm>
         </p:spPr>
         <p:txBody>
@@ -5964,7 +6118,7 @@
                 <a:ea typeface="Noto Serif CJK SC"/>
                 <a:cs typeface="Noto Sans Devanagari" panose="020B0502040504020204" pitchFamily="34" charset="0"/>
               </a:rPr>
-              <a:t>als Mitspieler zu sammeln</a:t>
+              <a:t>als die anderen Mitspieler zu sammeln</a:t>
             </a:r>
           </a:p>
         </p:txBody>
@@ -8355,7 +8509,7 @@
         <p:spPr>
           <a:xfrm>
             <a:off x="3317133" y="3429000"/>
-            <a:ext cx="6306768" cy="1815882"/>
+            <a:ext cx="6984458" cy="1815882"/>
           </a:xfrm>
           <a:prstGeom prst="rect">
             <a:avLst/>
@@ -8374,7 +8528,7 @@
             </a:pPr>
             <a:r>
               <a:rPr lang="de-CH" sz="2800" dirty="0"/>
-              <a:t>ungültige Befehle umzugehen</a:t>
+              <a:t>mit ungültige Befehle umzugehen können</a:t>
             </a:r>
           </a:p>
           <a:p>

</xml_diff>